<commit_message>
Update Gong PPT and Testing list etc.
</commit_message>
<xml_diff>
--- a/002Matlab Project/Project.pptx
+++ b/002Matlab Project/Project.pptx
@@ -5,7 +5,7 @@
     <p:sldMasterId id="2147483648" r:id="rId1"/>
   </p:sldMasterIdLst>
   <p:notesMasterIdLst>
-    <p:notesMasterId r:id="rId10"/>
+    <p:notesMasterId r:id="rId13"/>
   </p:notesMasterIdLst>
   <p:sldIdLst>
     <p:sldId id="256" r:id="rId2"/>
@@ -13,9 +13,12 @@
     <p:sldId id="263" r:id="rId4"/>
     <p:sldId id="266" r:id="rId5"/>
     <p:sldId id="267" r:id="rId6"/>
-    <p:sldId id="264" r:id="rId7"/>
-    <p:sldId id="265" r:id="rId8"/>
-    <p:sldId id="260" r:id="rId9"/>
+    <p:sldId id="269" r:id="rId7"/>
+    <p:sldId id="271" r:id="rId8"/>
+    <p:sldId id="264" r:id="rId9"/>
+    <p:sldId id="270" r:id="rId10"/>
+    <p:sldId id="272" r:id="rId11"/>
+    <p:sldId id="260" r:id="rId12"/>
   </p:sldIdLst>
   <p:sldSz cx="9144000" cy="5143500" type="screen16x9"/>
   <p:notesSz cx="6858000" cy="9947275"/>
@@ -409,13 +412,7 @@
   <p:cSld>
     <p:spTree>
       <p:nvGrpSpPr>
-        <p:cNvPr id="1" name="">
-          <a:extLst>
-            <a:ext uri="{FF2B5EF4-FFF2-40B4-BE49-F238E27FC236}">
-              <a16:creationId xmlns:a16="http://schemas.microsoft.com/office/drawing/2014/main" id="{66BD4900-F60E-213D-9D93-CDD1C13C62C4}"/>
-            </a:ext>
-          </a:extLst>
-        </p:cNvPr>
+        <p:cNvPr id="1" name=""/>
         <p:cNvGrpSpPr/>
         <p:nvPr/>
       </p:nvGrpSpPr>
@@ -429,13 +426,7 @@
       </p:grpSpPr>
       <p:sp>
         <p:nvSpPr>
-          <p:cNvPr id="2" name="幻灯片图像占位符 1">
-            <a:extLst>
-              <a:ext uri="{FF2B5EF4-FFF2-40B4-BE49-F238E27FC236}">
-                <a16:creationId xmlns:a16="http://schemas.microsoft.com/office/drawing/2014/main" id="{C1BA39E2-D31A-4716-3B9E-5B6577720D59}"/>
-              </a:ext>
-            </a:extLst>
-          </p:cNvPr>
+          <p:cNvPr id="2" name="幻灯片图像占位符 1"/>
           <p:cNvSpPr>
             <a:spLocks noGrp="1" noRot="1" noChangeAspect="1"/>
           </p:cNvSpPr>
@@ -447,13 +438,7 @@
       </p:sp>
       <p:sp>
         <p:nvSpPr>
-          <p:cNvPr id="3" name="备注占位符 2">
-            <a:extLst>
-              <a:ext uri="{FF2B5EF4-FFF2-40B4-BE49-F238E27FC236}">
-                <a16:creationId xmlns:a16="http://schemas.microsoft.com/office/drawing/2014/main" id="{561FC7EE-7350-ADB8-B806-CFAF4B64DC22}"/>
-              </a:ext>
-            </a:extLst>
-          </p:cNvPr>
+          <p:cNvPr id="3" name="备注占位符 2"/>
           <p:cNvSpPr>
             <a:spLocks noGrp="1"/>
           </p:cNvSpPr>
@@ -466,28 +451,18 @@
           <a:bodyPr/>
           <a:lstStyle/>
           <a:p>
-            <a:r>
-              <a:rPr lang="en-US" altLang="zh-CN" dirty="0"/>
-              <a:t>029030dc-a7b8-4b08-84f7-8538096bc74a.source.5.zh-Hans</a:t>
-            </a:r>
             <a:endParaRPr lang="zh-CN" altLang="en-US" dirty="0"/>
           </a:p>
         </p:txBody>
       </p:sp>
       <p:sp>
         <p:nvSpPr>
-          <p:cNvPr id="4" name="灯片编号占位符 3">
-            <a:extLst>
-              <a:ext uri="{FF2B5EF4-FFF2-40B4-BE49-F238E27FC236}">
-                <a16:creationId xmlns:a16="http://schemas.microsoft.com/office/drawing/2014/main" id="{5C8243BF-B4BE-25F5-5C9C-5C6F2BBF8734}"/>
-              </a:ext>
-            </a:extLst>
-          </p:cNvPr>
+          <p:cNvPr id="4" name="灯片编号占位符 3"/>
           <p:cNvSpPr>
             <a:spLocks noGrp="1"/>
           </p:cNvSpPr>
           <p:nvPr>
-            <p:ph type="sldNum" sz="quarter" idx="10"/>
+            <p:ph type="sldNum" sz="quarter" idx="5"/>
           </p:nvPr>
         </p:nvSpPr>
         <p:spPr/>
@@ -495,18 +470,19 @@
           <a:bodyPr/>
           <a:lstStyle/>
           <a:p>
-            <a:fld id="{E9E6FDB6-6D2B-46C1-9FA1-D82906A37C3A}" type="slidenum">
-              <a:rPr lang="zh-CN" altLang="en-US" smtClean="0"/>
-              <a:t>7</a:t>
+            <a:fld id="{49DD4D23-C98A-435E-AE88-9061F8349B02}" type="slidenum">
+              <a:rPr lang="en-GB" smtClean="0"/>
+              <a:pPr/>
+              <a:t>6</a:t>
             </a:fld>
-            <a:endParaRPr lang="zh-CN" altLang="en-US"/>
+            <a:endParaRPr lang="en-GB"/>
           </a:p>
         </p:txBody>
       </p:sp>
     </p:spTree>
     <p:extLst>
       <p:ext uri="{BB962C8B-B14F-4D97-AF65-F5344CB8AC3E}">
-        <p14:creationId xmlns:p14="http://schemas.microsoft.com/office/powerpoint/2010/main" val="3894678962"/>
+        <p14:creationId xmlns:p14="http://schemas.microsoft.com/office/powerpoint/2010/main" val="890695336"/>
       </p:ext>
     </p:extLst>
   </p:cSld>
@@ -3283,6 +3259,193 @@
 </p:sld>
 </file>
 
+<file path=ppt/slides/slide10.xml><?xml version="1.0" encoding="utf-8"?>
+<p:sld xmlns:a="http://schemas.openxmlformats.org/drawingml/2006/main" xmlns:r="http://schemas.openxmlformats.org/officeDocument/2006/relationships" xmlns:p="http://schemas.openxmlformats.org/presentationml/2006/main">
+  <p:cSld>
+    <p:spTree>
+      <p:nvGrpSpPr>
+        <p:cNvPr id="1" name="">
+          <a:extLst>
+            <a:ext uri="{FF2B5EF4-FFF2-40B4-BE49-F238E27FC236}">
+              <a16:creationId xmlns:a16="http://schemas.microsoft.com/office/drawing/2014/main" id="{40A31C37-C258-306A-50C6-7BCC5147709A}"/>
+            </a:ext>
+          </a:extLst>
+        </p:cNvPr>
+        <p:cNvGrpSpPr/>
+        <p:nvPr/>
+      </p:nvGrpSpPr>
+      <p:grpSpPr>
+        <a:xfrm>
+          <a:off x="0" y="0"/>
+          <a:ext cx="0" cy="0"/>
+          <a:chOff x="0" y="0"/>
+          <a:chExt cx="0" cy="0"/>
+        </a:xfrm>
+      </p:grpSpPr>
+      <p:sp>
+        <p:nvSpPr>
+          <p:cNvPr id="2" name="Title 1">
+            <a:extLst>
+              <a:ext uri="{FF2B5EF4-FFF2-40B4-BE49-F238E27FC236}">
+                <a16:creationId xmlns:a16="http://schemas.microsoft.com/office/drawing/2014/main" id="{24562D67-549C-DA51-7BC8-05D08ED55C33}"/>
+              </a:ext>
+            </a:extLst>
+          </p:cNvPr>
+          <p:cNvSpPr>
+            <a:spLocks noGrp="1"/>
+          </p:cNvSpPr>
+          <p:nvPr>
+            <p:ph type="title"/>
+          </p:nvPr>
+        </p:nvSpPr>
+        <p:spPr>
+          <a:xfrm>
+            <a:off x="1150574" y="519274"/>
+            <a:ext cx="7500939" cy="421200"/>
+          </a:xfrm>
+        </p:spPr>
+        <p:txBody>
+          <a:bodyPr/>
+          <a:lstStyle/>
+          <a:p>
+            <a:r>
+              <a:rPr lang="en-US" altLang="zh-CN" dirty="0"/>
+              <a:t>E2E test</a:t>
+            </a:r>
+            <a:endParaRPr lang="en-GB" dirty="0"/>
+          </a:p>
+        </p:txBody>
+      </p:sp>
+      <p:sp>
+        <p:nvSpPr>
+          <p:cNvPr id="5" name="Slide Number Placeholder 4">
+            <a:extLst>
+              <a:ext uri="{FF2B5EF4-FFF2-40B4-BE49-F238E27FC236}">
+                <a16:creationId xmlns:a16="http://schemas.microsoft.com/office/drawing/2014/main" id="{3DCF2153-ED0A-F37C-0A0D-15A18D184D0A}"/>
+              </a:ext>
+            </a:extLst>
+          </p:cNvPr>
+          <p:cNvSpPr>
+            <a:spLocks noGrp="1"/>
+          </p:cNvSpPr>
+          <p:nvPr>
+            <p:ph type="sldNum" sz="quarter" idx="4"/>
+          </p:nvPr>
+        </p:nvSpPr>
+        <p:spPr>
+          <a:xfrm>
+            <a:off x="8039513" y="4881249"/>
+            <a:ext cx="290100" cy="191861"/>
+          </a:xfrm>
+        </p:spPr>
+        <p:txBody>
+          <a:bodyPr/>
+          <a:lstStyle/>
+          <a:p>
+            <a:fld id="{DDBE135E-2566-4748-853C-8A3B78F0FB00}" type="slidenum">
+              <a:rPr lang="en-GB" smtClean="0"/>
+              <a:pPr/>
+              <a:t>10</a:t>
+            </a:fld>
+            <a:endParaRPr lang="en-GB" dirty="0"/>
+          </a:p>
+        </p:txBody>
+      </p:sp>
+      <p:pic>
+        <p:nvPicPr>
+          <p:cNvPr id="4" name="图片 3">
+            <a:extLst>
+              <a:ext uri="{FF2B5EF4-FFF2-40B4-BE49-F238E27FC236}">
+                <a16:creationId xmlns:a16="http://schemas.microsoft.com/office/drawing/2014/main" id="{8633B3E0-3AE7-730F-3779-D812E5D15FF8}"/>
+              </a:ext>
+            </a:extLst>
+          </p:cNvPr>
+          <p:cNvPicPr>
+            <a:picLocks noChangeAspect="1"/>
+          </p:cNvPicPr>
+          <p:nvPr/>
+        </p:nvPicPr>
+        <p:blipFill>
+          <a:blip r:embed="rId2"/>
+          <a:stretch>
+            <a:fillRect/>
+          </a:stretch>
+        </p:blipFill>
+        <p:spPr>
+          <a:xfrm>
+            <a:off x="0" y="1875205"/>
+            <a:ext cx="9144000" cy="1393089"/>
+          </a:xfrm>
+          <a:prstGeom prst="rect">
+            <a:avLst/>
+          </a:prstGeom>
+        </p:spPr>
+      </p:pic>
+    </p:spTree>
+    <p:extLst>
+      <p:ext uri="{BB962C8B-B14F-4D97-AF65-F5344CB8AC3E}">
+        <p14:creationId xmlns:p14="http://schemas.microsoft.com/office/powerpoint/2010/main" val="3686621771"/>
+      </p:ext>
+    </p:extLst>
+  </p:cSld>
+  <p:clrMapOvr>
+    <a:masterClrMapping/>
+  </p:clrMapOvr>
+</p:sld>
+</file>
+
+<file path=ppt/slides/slide11.xml><?xml version="1.0" encoding="utf-8"?>
+<p:sld xmlns:a="http://schemas.openxmlformats.org/drawingml/2006/main" xmlns:r="http://schemas.openxmlformats.org/officeDocument/2006/relationships" xmlns:p="http://schemas.openxmlformats.org/presentationml/2006/main">
+  <p:cSld>
+    <p:spTree>
+      <p:nvGrpSpPr>
+        <p:cNvPr id="1" name=""/>
+        <p:cNvGrpSpPr/>
+        <p:nvPr/>
+      </p:nvGrpSpPr>
+      <p:grpSpPr>
+        <a:xfrm>
+          <a:off x="0" y="0"/>
+          <a:ext cx="0" cy="0"/>
+          <a:chOff x="0" y="0"/>
+          <a:chExt cx="0" cy="0"/>
+        </a:xfrm>
+      </p:grpSpPr>
+      <p:sp>
+        <p:nvSpPr>
+          <p:cNvPr id="2" name="Title 1"/>
+          <p:cNvSpPr>
+            <a:spLocks noGrp="1"/>
+          </p:cNvSpPr>
+          <p:nvPr>
+            <p:ph type="ctrTitle"/>
+          </p:nvPr>
+        </p:nvSpPr>
+        <p:spPr/>
+        <p:txBody>
+          <a:bodyPr/>
+          <a:lstStyle/>
+          <a:p>
+            <a:r>
+              <a:rPr lang="en-GB"/>
+              <a:t>Thank You</a:t>
+            </a:r>
+          </a:p>
+        </p:txBody>
+      </p:sp>
+    </p:spTree>
+    <p:extLst>
+      <p:ext uri="{BB962C8B-B14F-4D97-AF65-F5344CB8AC3E}">
+        <p14:creationId xmlns:p14="http://schemas.microsoft.com/office/powerpoint/2010/main" val="173462149"/>
+      </p:ext>
+    </p:extLst>
+  </p:cSld>
+  <p:clrMapOvr>
+    <a:masterClrMapping/>
+  </p:clrMapOvr>
+</p:sld>
+</file>
+
 <file path=ppt/slides/slide2.xml><?xml version="1.0" encoding="utf-8"?>
 <p:sld xmlns:a="http://schemas.openxmlformats.org/drawingml/2006/main" xmlns:r="http://schemas.openxmlformats.org/officeDocument/2006/relationships" xmlns:p="http://schemas.openxmlformats.org/presentationml/2006/main">
   <p:cSld>
@@ -4605,8 +4768,8 @@
         </p:blipFill>
         <p:spPr>
           <a:xfrm>
-            <a:off x="0" y="2082046"/>
-            <a:ext cx="3904430" cy="1360401"/>
+            <a:off x="0" y="1937725"/>
+            <a:ext cx="3904430" cy="1268047"/>
           </a:xfrm>
           <a:prstGeom prst="rect">
             <a:avLst/>
@@ -4631,7 +4794,13 @@
   <p:cSld>
     <p:spTree>
       <p:nvGrpSpPr>
-        <p:cNvPr id="1" name=""/>
+        <p:cNvPr id="1" name="">
+          <a:extLst>
+            <a:ext uri="{FF2B5EF4-FFF2-40B4-BE49-F238E27FC236}">
+              <a16:creationId xmlns:a16="http://schemas.microsoft.com/office/drawing/2014/main" id="{F915FA1C-0B51-BE30-8156-758504DE52E4}"/>
+            </a:ext>
+          </a:extLst>
+        </p:cNvPr>
         <p:cNvGrpSpPr/>
         <p:nvPr/>
       </p:nvGrpSpPr>
@@ -4645,51 +4814,35 @@
       </p:grpSpPr>
       <p:sp>
         <p:nvSpPr>
-          <p:cNvPr id="2" name="Title 1"/>
+          <p:cNvPr id="2" name="Title 1">
+            <a:extLst>
+              <a:ext uri="{FF2B5EF4-FFF2-40B4-BE49-F238E27FC236}">
+                <a16:creationId xmlns:a16="http://schemas.microsoft.com/office/drawing/2014/main" id="{2417EE9E-0A76-31F5-26D1-85C4D689016B}"/>
+              </a:ext>
+            </a:extLst>
+          </p:cNvPr>
           <p:cNvSpPr>
             <a:spLocks noGrp="1"/>
           </p:cNvSpPr>
           <p:nvPr>
-            <p:ph type="title"/>
-          </p:nvPr>
-        </p:nvSpPr>
-        <p:spPr/>
+            <p:ph type="title" idx="4294967295"/>
+          </p:nvPr>
+        </p:nvSpPr>
+        <p:spPr>
+          <a:xfrm>
+            <a:off x="555863" y="505563"/>
+            <a:ext cx="7500937" cy="422275"/>
+          </a:xfrm>
+        </p:spPr>
         <p:txBody>
           <a:bodyPr/>
           <a:lstStyle/>
           <a:p>
             <a:r>
               <a:rPr lang="en-US" altLang="zh-CN" dirty="0"/>
-              <a:t>Group Introduction</a:t>
+              <a:t>Function Blocks</a:t>
             </a:r>
             <a:endParaRPr lang="en-GB" dirty="0"/>
-          </a:p>
-        </p:txBody>
-      </p:sp>
-      <p:sp>
-        <p:nvSpPr>
-          <p:cNvPr id="4" name="Text Placeholder 3"/>
-          <p:cNvSpPr>
-            <a:spLocks noGrp="1"/>
-          </p:cNvSpPr>
-          <p:nvPr>
-            <p:ph type="body" sz="quarter" idx="11"/>
-          </p:nvPr>
-        </p:nvSpPr>
-        <p:spPr>
-          <a:xfrm>
-            <a:off x="828675" y="685806"/>
-            <a:ext cx="7500938" cy="350994"/>
-          </a:xfrm>
-        </p:spPr>
-        <p:txBody>
-          <a:bodyPr/>
-          <a:lstStyle/>
-          <a:p>
-            <a:r>
-              <a:rPr lang="en-GB" dirty="0"/>
-              <a:t>The development of Network-on-Chip</a:t>
-            </a:r>
           </a:p>
         </p:txBody>
       </p:sp>
@@ -4698,7 +4851,7 @@
           <p:cNvPr id="5" name="Slide Number Placeholder 4">
             <a:extLst>
               <a:ext uri="{FF2B5EF4-FFF2-40B4-BE49-F238E27FC236}">
-                <a16:creationId xmlns:a16="http://schemas.microsoft.com/office/drawing/2014/main" id="{0352E26E-3FA3-004E-AE8F-EF74CEC96E15}"/>
+                <a16:creationId xmlns:a16="http://schemas.microsoft.com/office/drawing/2014/main" id="{45811AE1-047F-3C39-36B0-B482EF73F8CD}"/>
               </a:ext>
             </a:extLst>
           </p:cNvPr>
@@ -4706,13 +4859,13 @@
             <a:spLocks noGrp="1"/>
           </p:cNvSpPr>
           <p:nvPr>
-            <p:ph type="sldNum" sz="quarter" idx="4"/>
-          </p:nvPr>
-        </p:nvSpPr>
-        <p:spPr>
-          <a:xfrm>
-            <a:off x="8039513" y="4881249"/>
-            <a:ext cx="290100" cy="191861"/>
+            <p:ph type="sldNum" sz="quarter" idx="4294967295"/>
+          </p:nvPr>
+        </p:nvSpPr>
+        <p:spPr>
+          <a:xfrm>
+            <a:off x="8853488" y="4881563"/>
+            <a:ext cx="290512" cy="192087"/>
           </a:xfrm>
         </p:spPr>
         <p:txBody>
@@ -4728,35 +4881,285 @@
           </a:p>
         </p:txBody>
       </p:sp>
-      <p:sp>
-        <p:nvSpPr>
-          <p:cNvPr id="7" name="Text Placeholder 6">
+      <p:pic>
+        <p:nvPicPr>
+          <p:cNvPr id="7" name="图片 6">
             <a:extLst>
               <a:ext uri="{FF2B5EF4-FFF2-40B4-BE49-F238E27FC236}">
-                <a16:creationId xmlns:a16="http://schemas.microsoft.com/office/drawing/2014/main" id="{C47A9B83-74A6-114D-9D6E-35E5B803BA13}"/>
+                <a16:creationId xmlns:a16="http://schemas.microsoft.com/office/drawing/2014/main" id="{21FA3703-0BA3-00A4-3686-B1320398651B}"/>
               </a:ext>
             </a:extLst>
           </p:cNvPr>
-          <p:cNvSpPr>
-            <a:spLocks noGrp="1"/>
-          </p:cNvSpPr>
-          <p:nvPr>
-            <p:ph type="body" sz="quarter" idx="10"/>
-          </p:nvPr>
-        </p:nvSpPr>
-        <p:spPr/>
-        <p:txBody>
-          <a:bodyPr/>
-          <a:lstStyle/>
-          <a:p>
-            <a:endParaRPr lang="en-IE" dirty="0"/>
+          <p:cNvPicPr>
+            <a:picLocks noChangeAspect="1"/>
+          </p:cNvPicPr>
+          <p:nvPr/>
+        </p:nvPicPr>
+        <p:blipFill>
+          <a:blip r:embed="rId3">
+            <a:extLst>
+              <a:ext uri="{28A0092B-C50C-407E-A947-70E740481C1C}">
+                <a14:useLocalDpi xmlns:a14="http://schemas.microsoft.com/office/drawing/2010/main" val="0"/>
+              </a:ext>
+            </a:extLst>
+          </a:blip>
+          <a:stretch>
+            <a:fillRect/>
+          </a:stretch>
+        </p:blipFill>
+        <p:spPr>
+          <a:xfrm>
+            <a:off x="4845600" y="1380762"/>
+            <a:ext cx="3856637" cy="3322477"/>
+          </a:xfrm>
+          <a:prstGeom prst="rect">
+            <a:avLst/>
+          </a:prstGeom>
+        </p:spPr>
+      </p:pic>
+      <p:pic>
+        <p:nvPicPr>
+          <p:cNvPr id="8" name="图片 7">
+            <a:extLst>
+              <a:ext uri="{FF2B5EF4-FFF2-40B4-BE49-F238E27FC236}">
+                <a16:creationId xmlns:a16="http://schemas.microsoft.com/office/drawing/2014/main" id="{1B7B8154-3CED-CB3F-D56E-A468AED3AAB5}"/>
+              </a:ext>
+            </a:extLst>
+          </p:cNvPr>
+          <p:cNvPicPr>
+            <a:picLocks noChangeAspect="1"/>
+          </p:cNvPicPr>
+          <p:nvPr/>
+        </p:nvPicPr>
+        <p:blipFill>
+          <a:blip r:embed="rId4">
+            <a:extLst>
+              <a:ext uri="{28A0092B-C50C-407E-A947-70E740481C1C}">
+                <a14:useLocalDpi xmlns:a14="http://schemas.microsoft.com/office/drawing/2010/main" val="0"/>
+              </a:ext>
+            </a:extLst>
+          </a:blip>
+          <a:stretch>
+            <a:fillRect/>
+          </a:stretch>
+        </p:blipFill>
+        <p:spPr>
+          <a:xfrm>
+            <a:off x="335570" y="1135656"/>
+            <a:ext cx="4385554" cy="1906345"/>
+          </a:xfrm>
+          <a:prstGeom prst="rect">
+            <a:avLst/>
+          </a:prstGeom>
+        </p:spPr>
+      </p:pic>
+      <p:sp>
+        <p:nvSpPr>
+          <p:cNvPr id="9" name="Text Placeholder 2">
+            <a:extLst>
+              <a:ext uri="{FF2B5EF4-FFF2-40B4-BE49-F238E27FC236}">
+                <a16:creationId xmlns:a16="http://schemas.microsoft.com/office/drawing/2014/main" id="{B0726243-113E-4816-05AB-816CE56F2EB3}"/>
+              </a:ext>
+            </a:extLst>
+          </p:cNvPr>
+          <p:cNvSpPr txBox="1">
+            <a:spLocks/>
+          </p:cNvSpPr>
+          <p:nvPr/>
+        </p:nvSpPr>
+        <p:spPr>
+          <a:xfrm>
+            <a:off x="335570" y="3054671"/>
+            <a:ext cx="4424362" cy="1699200"/>
+          </a:xfrm>
+          <a:prstGeom prst="rect">
+            <a:avLst/>
+          </a:prstGeom>
+        </p:spPr>
+        <p:txBody>
+          <a:bodyPr vert="horz" lIns="0" tIns="0" rIns="0" bIns="0" rtlCol="0">
+            <a:noAutofit/>
+          </a:bodyPr>
+          <a:lstStyle>
+            <a:lvl1pPr marL="0" indent="0" algn="l" defTabSz="914400" rtl="0" eaLnBrk="1" latinLnBrk="0" hangingPunct="1">
+              <a:spcBef>
+                <a:spcPts val="1417"/>
+              </a:spcBef>
+              <a:buFont typeface="Arial" pitchFamily="34" charset="0"/>
+              <a:buNone/>
+              <a:defRPr sz="2000" b="1" kern="1200">
+                <a:solidFill>
+                  <a:schemeClr val="tx1"/>
+                </a:solidFill>
+                <a:latin typeface="+mn-lt"/>
+                <a:ea typeface="+mn-ea"/>
+                <a:cs typeface="+mn-cs"/>
+              </a:defRPr>
+            </a:lvl1pPr>
+            <a:lvl2pPr marL="317500" indent="-317500" algn="l" defTabSz="914400" rtl="0" eaLnBrk="1" latinLnBrk="0" hangingPunct="1">
+              <a:spcBef>
+                <a:spcPts val="1134"/>
+              </a:spcBef>
+              <a:buClr>
+                <a:schemeClr val="tx2"/>
+              </a:buClr>
+              <a:buFont typeface="Arial" pitchFamily="34" charset="0"/>
+              <a:buChar char="–"/>
+              <a:defRPr sz="2000" kern="1200">
+                <a:solidFill>
+                  <a:schemeClr val="tx1"/>
+                </a:solidFill>
+                <a:latin typeface="+mn-lt"/>
+                <a:ea typeface="+mn-ea"/>
+                <a:cs typeface="+mn-cs"/>
+              </a:defRPr>
+            </a:lvl2pPr>
+            <a:lvl3pPr marL="568325" indent="-222250" algn="l" defTabSz="914400" rtl="0" eaLnBrk="1" latinLnBrk="0" hangingPunct="1">
+              <a:spcBef>
+                <a:spcPts val="1134"/>
+              </a:spcBef>
+              <a:buClr>
+                <a:schemeClr val="tx2"/>
+              </a:buClr>
+              <a:buFont typeface="Arial" pitchFamily="34" charset="0"/>
+              <a:buChar char="•"/>
+              <a:defRPr sz="2000" kern="1200">
+                <a:solidFill>
+                  <a:schemeClr val="tx1"/>
+                </a:solidFill>
+                <a:latin typeface="+mn-lt"/>
+                <a:ea typeface="+mn-ea"/>
+                <a:cs typeface="+mn-cs"/>
+              </a:defRPr>
+            </a:lvl3pPr>
+            <a:lvl4pPr marL="784225" indent="-201613" algn="l" defTabSz="914400" rtl="0" eaLnBrk="1" latinLnBrk="0" hangingPunct="1">
+              <a:spcBef>
+                <a:spcPts val="1134"/>
+              </a:spcBef>
+              <a:buClr>
+                <a:schemeClr val="tx2"/>
+              </a:buClr>
+              <a:buFont typeface="Minion Pro" pitchFamily="18" charset="0"/>
+              <a:buChar char="‒"/>
+              <a:defRPr sz="2000" kern="1200">
+                <a:solidFill>
+                  <a:schemeClr val="tx1"/>
+                </a:solidFill>
+                <a:latin typeface="+mn-lt"/>
+                <a:ea typeface="+mn-ea"/>
+                <a:cs typeface="+mn-cs"/>
+              </a:defRPr>
+            </a:lvl4pPr>
+            <a:lvl5pPr marL="1000125" indent="-185738" algn="l" defTabSz="914400" rtl="0" eaLnBrk="1" latinLnBrk="0" hangingPunct="1">
+              <a:spcBef>
+                <a:spcPts val="1134"/>
+              </a:spcBef>
+              <a:buClr>
+                <a:schemeClr val="tx2"/>
+              </a:buClr>
+              <a:buFont typeface="Arial" pitchFamily="34" charset="0"/>
+              <a:buChar char="»"/>
+              <a:defRPr sz="2000" kern="1200">
+                <a:solidFill>
+                  <a:schemeClr val="tx1"/>
+                </a:solidFill>
+                <a:latin typeface="+mn-lt"/>
+                <a:ea typeface="+mn-ea"/>
+                <a:cs typeface="+mn-cs"/>
+              </a:defRPr>
+            </a:lvl5pPr>
+            <a:lvl6pPr marL="2514600" indent="-228600" algn="l" defTabSz="914400" rtl="0" eaLnBrk="1" latinLnBrk="0" hangingPunct="1">
+              <a:spcBef>
+                <a:spcPct val="20000"/>
+              </a:spcBef>
+              <a:buFont typeface="Arial" pitchFamily="34" charset="0"/>
+              <a:buChar char="•"/>
+              <a:defRPr sz="2000" kern="1200">
+                <a:solidFill>
+                  <a:schemeClr val="tx1"/>
+                </a:solidFill>
+                <a:latin typeface="+mn-lt"/>
+                <a:ea typeface="+mn-ea"/>
+                <a:cs typeface="+mn-cs"/>
+              </a:defRPr>
+            </a:lvl6pPr>
+            <a:lvl7pPr marL="2971800" indent="-228600" algn="l" defTabSz="914400" rtl="0" eaLnBrk="1" latinLnBrk="0" hangingPunct="1">
+              <a:spcBef>
+                <a:spcPct val="20000"/>
+              </a:spcBef>
+              <a:buFont typeface="Arial" pitchFamily="34" charset="0"/>
+              <a:buChar char="•"/>
+              <a:defRPr sz="2000" kern="1200">
+                <a:solidFill>
+                  <a:schemeClr val="tx1"/>
+                </a:solidFill>
+                <a:latin typeface="+mn-lt"/>
+                <a:ea typeface="+mn-ea"/>
+                <a:cs typeface="+mn-cs"/>
+              </a:defRPr>
+            </a:lvl7pPr>
+            <a:lvl8pPr marL="3429000" indent="-228600" algn="l" defTabSz="914400" rtl="0" eaLnBrk="1" latinLnBrk="0" hangingPunct="1">
+              <a:spcBef>
+                <a:spcPct val="20000"/>
+              </a:spcBef>
+              <a:buFont typeface="Arial" pitchFamily="34" charset="0"/>
+              <a:buChar char="•"/>
+              <a:defRPr sz="2000" kern="1200">
+                <a:solidFill>
+                  <a:schemeClr val="tx1"/>
+                </a:solidFill>
+                <a:latin typeface="+mn-lt"/>
+                <a:ea typeface="+mn-ea"/>
+                <a:cs typeface="+mn-cs"/>
+              </a:defRPr>
+            </a:lvl8pPr>
+            <a:lvl9pPr marL="3886200" indent="-228600" algn="l" defTabSz="914400" rtl="0" eaLnBrk="1" latinLnBrk="0" hangingPunct="1">
+              <a:spcBef>
+                <a:spcPct val="20000"/>
+              </a:spcBef>
+              <a:buFont typeface="Arial" pitchFamily="34" charset="0"/>
+              <a:buChar char="•"/>
+              <a:defRPr sz="2000" kern="1200">
+                <a:solidFill>
+                  <a:schemeClr val="tx1"/>
+                </a:solidFill>
+                <a:latin typeface="+mn-lt"/>
+                <a:ea typeface="+mn-ea"/>
+                <a:cs typeface="+mn-cs"/>
+              </a:defRPr>
+            </a:lvl9pPr>
+          </a:lstStyle>
+          <a:p>
+            <a:r>
+              <a:rPr lang="en-US" altLang="zh-CN" sz="1600" dirty="0"/>
+              <a:t>User Interface</a:t>
+            </a:r>
+          </a:p>
+          <a:p>
+            <a:r>
+              <a:rPr lang="en-US" sz="1400" b="0" dirty="0"/>
+              <a:t>Data visualization capabilities</a:t>
+            </a:r>
+          </a:p>
+          <a:p>
+            <a:r>
+              <a:rPr lang="en-US" sz="1400" b="0" dirty="0"/>
+              <a:t>Easy integration with MATLAB's computational functions</a:t>
+            </a:r>
+          </a:p>
+          <a:p>
+            <a:r>
+              <a:rPr lang="en-US" sz="1400" b="0" dirty="0"/>
+              <a:t>User-friendly interface for creating and customizing GUIs without needing extensive programming skills.</a:t>
+            </a:r>
+            <a:endParaRPr lang="en-IE" sz="1400" b="0" dirty="0"/>
           </a:p>
         </p:txBody>
       </p:sp>
     </p:spTree>
     <p:extLst>
       <p:ext uri="{BB962C8B-B14F-4D97-AF65-F5344CB8AC3E}">
-        <p14:creationId xmlns:p14="http://schemas.microsoft.com/office/powerpoint/2010/main" val="2688214604"/>
+        <p14:creationId xmlns:p14="http://schemas.microsoft.com/office/powerpoint/2010/main" val="2709373467"/>
       </p:ext>
     </p:extLst>
   </p:cSld>
@@ -4774,7 +5177,7 @@
         <p:cNvPr id="1" name="">
           <a:extLst>
             <a:ext uri="{FF2B5EF4-FFF2-40B4-BE49-F238E27FC236}">
-              <a16:creationId xmlns:a16="http://schemas.microsoft.com/office/drawing/2014/main" id="{31760CA0-CDD3-96F1-59ED-F08B9AB1CE61}"/>
+              <a16:creationId xmlns:a16="http://schemas.microsoft.com/office/drawing/2014/main" id="{7C19F780-F127-B687-0B4C-89929B23D7AC}"/>
             </a:ext>
           </a:extLst>
         </p:cNvPr>
@@ -4789,10 +5192,115 @@
           <a:chExt cx="0" cy="0"/>
         </a:xfrm>
       </p:grpSpPr>
+      <p:sp>
+        <p:nvSpPr>
+          <p:cNvPr id="2" name="Title 1">
+            <a:extLst>
+              <a:ext uri="{FF2B5EF4-FFF2-40B4-BE49-F238E27FC236}">
+                <a16:creationId xmlns:a16="http://schemas.microsoft.com/office/drawing/2014/main" id="{C8DD35C0-DFA7-D010-0785-DD914BEC7A02}"/>
+              </a:ext>
+            </a:extLst>
+          </p:cNvPr>
+          <p:cNvSpPr>
+            <a:spLocks noGrp="1"/>
+          </p:cNvSpPr>
+          <p:nvPr>
+            <p:ph type="title"/>
+          </p:nvPr>
+        </p:nvSpPr>
+        <p:spPr>
+          <a:xfrm>
+            <a:off x="821530" y="542674"/>
+            <a:ext cx="7500939" cy="421200"/>
+          </a:xfrm>
+        </p:spPr>
+        <p:txBody>
+          <a:bodyPr/>
+          <a:lstStyle/>
+          <a:p>
+            <a:r>
+              <a:rPr lang="en-US" altLang="zh-CN" dirty="0" err="1"/>
+              <a:t>Unittest</a:t>
+            </a:r>
+            <a:endParaRPr lang="en-GB" dirty="0"/>
+          </a:p>
+        </p:txBody>
+      </p:sp>
+      <p:sp>
+        <p:nvSpPr>
+          <p:cNvPr id="5" name="Slide Number Placeholder 4">
+            <a:extLst>
+              <a:ext uri="{FF2B5EF4-FFF2-40B4-BE49-F238E27FC236}">
+                <a16:creationId xmlns:a16="http://schemas.microsoft.com/office/drawing/2014/main" id="{71F0EFE8-7B12-CAA6-5036-78451E78F868}"/>
+              </a:ext>
+            </a:extLst>
+          </p:cNvPr>
+          <p:cNvSpPr>
+            <a:spLocks noGrp="1"/>
+          </p:cNvSpPr>
+          <p:nvPr>
+            <p:ph type="sldNum" sz="quarter" idx="4"/>
+          </p:nvPr>
+        </p:nvSpPr>
+        <p:spPr>
+          <a:xfrm>
+            <a:off x="8039513" y="4881249"/>
+            <a:ext cx="290100" cy="191861"/>
+          </a:xfrm>
+        </p:spPr>
+        <p:txBody>
+          <a:bodyPr/>
+          <a:lstStyle/>
+          <a:p>
+            <a:fld id="{DDBE135E-2566-4748-853C-8A3B78F0FB00}" type="slidenum">
+              <a:rPr lang="en-GB" smtClean="0"/>
+              <a:pPr/>
+              <a:t>7</a:t>
+            </a:fld>
+            <a:endParaRPr lang="en-GB" dirty="0"/>
+          </a:p>
+        </p:txBody>
+      </p:sp>
+      <p:pic>
+        <p:nvPicPr>
+          <p:cNvPr id="4" name="图片 3">
+            <a:extLst>
+              <a:ext uri="{FF2B5EF4-FFF2-40B4-BE49-F238E27FC236}">
+                <a16:creationId xmlns:a16="http://schemas.microsoft.com/office/drawing/2014/main" id="{99F5AC40-8C88-20A1-DA12-E932859B0EA2}"/>
+              </a:ext>
+            </a:extLst>
+          </p:cNvPr>
+          <p:cNvPicPr>
+            <a:picLocks noChangeAspect="1"/>
+          </p:cNvPicPr>
+          <p:nvPr/>
+        </p:nvPicPr>
+        <p:blipFill>
+          <a:blip r:embed="rId2">
+            <a:extLst>
+              <a:ext uri="{28A0092B-C50C-407E-A947-70E740481C1C}">
+                <a14:useLocalDpi xmlns:a14="http://schemas.microsoft.com/office/drawing/2010/main" val="0"/>
+              </a:ext>
+            </a:extLst>
+          </a:blip>
+          <a:stretch>
+            <a:fillRect/>
+          </a:stretch>
+        </p:blipFill>
+        <p:spPr>
+          <a:xfrm>
+            <a:off x="1245955" y="1260211"/>
+            <a:ext cx="6652088" cy="3493827"/>
+          </a:xfrm>
+          <a:prstGeom prst="rect">
+            <a:avLst/>
+          </a:prstGeom>
+        </p:spPr>
+      </p:pic>
     </p:spTree>
     <p:extLst>
       <p:ext uri="{BB962C8B-B14F-4D97-AF65-F5344CB8AC3E}">
-        <p14:creationId xmlns:p14="http://schemas.microsoft.com/office/powerpoint/2010/main" val="1124990636"/>
+        <p14:creationId xmlns:p14="http://schemas.microsoft.com/office/powerpoint/2010/main" val="3157770545"/>
       </p:ext>
     </p:extLst>
   </p:cSld>
@@ -4826,25 +5334,236 @@
             <a:spLocks noGrp="1"/>
           </p:cNvSpPr>
           <p:nvPr>
-            <p:ph type="ctrTitle"/>
-          </p:nvPr>
-        </p:nvSpPr>
-        <p:spPr/>
+            <p:ph type="title"/>
+          </p:nvPr>
+        </p:nvSpPr>
+        <p:spPr>
+          <a:xfrm>
+            <a:off x="821530" y="542674"/>
+            <a:ext cx="7500939" cy="421200"/>
+          </a:xfrm>
+        </p:spPr>
         <p:txBody>
           <a:bodyPr/>
           <a:lstStyle/>
           <a:p>
             <a:r>
-              <a:rPr lang="en-GB"/>
-              <a:t>Thank You</a:t>
-            </a:r>
-          </a:p>
-        </p:txBody>
-      </p:sp>
+              <a:rPr lang="en-US" altLang="zh-CN" dirty="0" err="1"/>
+              <a:t>Unittest</a:t>
+            </a:r>
+            <a:endParaRPr lang="en-GB" dirty="0"/>
+          </a:p>
+        </p:txBody>
+      </p:sp>
+      <p:sp>
+        <p:nvSpPr>
+          <p:cNvPr id="5" name="Slide Number Placeholder 4">
+            <a:extLst>
+              <a:ext uri="{FF2B5EF4-FFF2-40B4-BE49-F238E27FC236}">
+                <a16:creationId xmlns:a16="http://schemas.microsoft.com/office/drawing/2014/main" id="{0352E26E-3FA3-004E-AE8F-EF74CEC96E15}"/>
+              </a:ext>
+            </a:extLst>
+          </p:cNvPr>
+          <p:cNvSpPr>
+            <a:spLocks noGrp="1"/>
+          </p:cNvSpPr>
+          <p:nvPr>
+            <p:ph type="sldNum" sz="quarter" idx="4"/>
+          </p:nvPr>
+        </p:nvSpPr>
+        <p:spPr>
+          <a:xfrm>
+            <a:off x="8039513" y="4881249"/>
+            <a:ext cx="290100" cy="191861"/>
+          </a:xfrm>
+        </p:spPr>
+        <p:txBody>
+          <a:bodyPr/>
+          <a:lstStyle/>
+          <a:p>
+            <a:fld id="{DDBE135E-2566-4748-853C-8A3B78F0FB00}" type="slidenum">
+              <a:rPr lang="en-GB" smtClean="0"/>
+              <a:pPr/>
+              <a:t>8</a:t>
+            </a:fld>
+            <a:endParaRPr lang="en-GB" dirty="0"/>
+          </a:p>
+        </p:txBody>
+      </p:sp>
+      <p:pic>
+        <p:nvPicPr>
+          <p:cNvPr id="10" name="图片 9">
+            <a:extLst>
+              <a:ext uri="{FF2B5EF4-FFF2-40B4-BE49-F238E27FC236}">
+                <a16:creationId xmlns:a16="http://schemas.microsoft.com/office/drawing/2014/main" id="{ADAFD111-5888-0AF3-47A2-423E00A65AD3}"/>
+              </a:ext>
+            </a:extLst>
+          </p:cNvPr>
+          <p:cNvPicPr>
+            <a:picLocks noChangeAspect="1"/>
+          </p:cNvPicPr>
+          <p:nvPr/>
+        </p:nvPicPr>
+        <p:blipFill>
+          <a:blip r:embed="rId2"/>
+          <a:stretch>
+            <a:fillRect/>
+          </a:stretch>
+        </p:blipFill>
+        <p:spPr>
+          <a:xfrm>
+            <a:off x="0" y="1229948"/>
+            <a:ext cx="9144000" cy="3466549"/>
+          </a:xfrm>
+          <a:prstGeom prst="rect">
+            <a:avLst/>
+          </a:prstGeom>
+        </p:spPr>
+      </p:pic>
     </p:spTree>
     <p:extLst>
       <p:ext uri="{BB962C8B-B14F-4D97-AF65-F5344CB8AC3E}">
-        <p14:creationId xmlns:p14="http://schemas.microsoft.com/office/powerpoint/2010/main" val="173462149"/>
+        <p14:creationId xmlns:p14="http://schemas.microsoft.com/office/powerpoint/2010/main" val="2688214604"/>
+      </p:ext>
+    </p:extLst>
+  </p:cSld>
+  <p:clrMapOvr>
+    <a:masterClrMapping/>
+  </p:clrMapOvr>
+</p:sld>
+</file>
+
+<file path=ppt/slides/slide9.xml><?xml version="1.0" encoding="utf-8"?>
+<p:sld xmlns:a="http://schemas.openxmlformats.org/drawingml/2006/main" xmlns:r="http://schemas.openxmlformats.org/officeDocument/2006/relationships" xmlns:p="http://schemas.openxmlformats.org/presentationml/2006/main">
+  <p:cSld>
+    <p:spTree>
+      <p:nvGrpSpPr>
+        <p:cNvPr id="1" name="">
+          <a:extLst>
+            <a:ext uri="{FF2B5EF4-FFF2-40B4-BE49-F238E27FC236}">
+              <a16:creationId xmlns:a16="http://schemas.microsoft.com/office/drawing/2014/main" id="{255EA639-742A-D0BC-F08F-6C1D1A38AAD4}"/>
+            </a:ext>
+          </a:extLst>
+        </p:cNvPr>
+        <p:cNvGrpSpPr/>
+        <p:nvPr/>
+      </p:nvGrpSpPr>
+      <p:grpSpPr>
+        <a:xfrm>
+          <a:off x="0" y="0"/>
+          <a:ext cx="0" cy="0"/>
+          <a:chOff x="0" y="0"/>
+          <a:chExt cx="0" cy="0"/>
+        </a:xfrm>
+      </p:grpSpPr>
+      <p:sp>
+        <p:nvSpPr>
+          <p:cNvPr id="2" name="Title 1">
+            <a:extLst>
+              <a:ext uri="{FF2B5EF4-FFF2-40B4-BE49-F238E27FC236}">
+                <a16:creationId xmlns:a16="http://schemas.microsoft.com/office/drawing/2014/main" id="{94D9B099-9E59-20D5-569E-A222D4BD9B45}"/>
+              </a:ext>
+            </a:extLst>
+          </p:cNvPr>
+          <p:cNvSpPr>
+            <a:spLocks noGrp="1"/>
+          </p:cNvSpPr>
+          <p:nvPr>
+            <p:ph type="title"/>
+          </p:nvPr>
+        </p:nvSpPr>
+        <p:spPr>
+          <a:xfrm>
+            <a:off x="1150574" y="519274"/>
+            <a:ext cx="7500939" cy="421200"/>
+          </a:xfrm>
+        </p:spPr>
+        <p:txBody>
+          <a:bodyPr/>
+          <a:lstStyle/>
+          <a:p>
+            <a:r>
+              <a:rPr lang="en-US" altLang="zh-CN" dirty="0"/>
+              <a:t>E2E test</a:t>
+            </a:r>
+            <a:endParaRPr lang="en-GB" dirty="0"/>
+          </a:p>
+        </p:txBody>
+      </p:sp>
+      <p:sp>
+        <p:nvSpPr>
+          <p:cNvPr id="5" name="Slide Number Placeholder 4">
+            <a:extLst>
+              <a:ext uri="{FF2B5EF4-FFF2-40B4-BE49-F238E27FC236}">
+                <a16:creationId xmlns:a16="http://schemas.microsoft.com/office/drawing/2014/main" id="{6B06168E-D2A2-9141-8F90-D08CFF216539}"/>
+              </a:ext>
+            </a:extLst>
+          </p:cNvPr>
+          <p:cNvSpPr>
+            <a:spLocks noGrp="1"/>
+          </p:cNvSpPr>
+          <p:nvPr>
+            <p:ph type="sldNum" sz="quarter" idx="4"/>
+          </p:nvPr>
+        </p:nvSpPr>
+        <p:spPr>
+          <a:xfrm>
+            <a:off x="8039513" y="4881249"/>
+            <a:ext cx="290100" cy="191861"/>
+          </a:xfrm>
+        </p:spPr>
+        <p:txBody>
+          <a:bodyPr/>
+          <a:lstStyle/>
+          <a:p>
+            <a:fld id="{DDBE135E-2566-4748-853C-8A3B78F0FB00}" type="slidenum">
+              <a:rPr lang="en-GB" smtClean="0"/>
+              <a:pPr/>
+              <a:t>9</a:t>
+            </a:fld>
+            <a:endParaRPr lang="en-GB" dirty="0"/>
+          </a:p>
+        </p:txBody>
+      </p:sp>
+      <p:pic>
+        <p:nvPicPr>
+          <p:cNvPr id="6" name="图片 5">
+            <a:extLst>
+              <a:ext uri="{FF2B5EF4-FFF2-40B4-BE49-F238E27FC236}">
+                <a16:creationId xmlns:a16="http://schemas.microsoft.com/office/drawing/2014/main" id="{B319EC00-B869-440E-01D2-50A07E003F5C}"/>
+              </a:ext>
+            </a:extLst>
+          </p:cNvPr>
+          <p:cNvPicPr>
+            <a:picLocks noChangeAspect="1"/>
+          </p:cNvPicPr>
+          <p:nvPr/>
+        </p:nvPicPr>
+        <p:blipFill rotWithShape="1">
+          <a:blip r:embed="rId2">
+            <a:extLst>
+              <a:ext uri="{28A0092B-C50C-407E-A947-70E740481C1C}">
+                <a14:useLocalDpi xmlns:a14="http://schemas.microsoft.com/office/drawing/2010/main" val="0"/>
+              </a:ext>
+            </a:extLst>
+          </a:blip>
+          <a:srcRect l="1773" t="5099" b="3826"/>
+          <a:stretch/>
+        </p:blipFill>
+        <p:spPr>
+          <a:xfrm>
+            <a:off x="1641600" y="1429879"/>
+            <a:ext cx="5860800" cy="2692076"/>
+          </a:xfrm>
+          <a:prstGeom prst="rect">
+            <a:avLst/>
+          </a:prstGeom>
+        </p:spPr>
+      </p:pic>
+    </p:spTree>
+    <p:extLst>
+      <p:ext uri="{BB962C8B-B14F-4D97-AF65-F5344CB8AC3E}">
+        <p14:creationId xmlns:p14="http://schemas.microsoft.com/office/powerpoint/2010/main" val="2173444909"/>
       </p:ext>
     </p:extLst>
   </p:cSld>

</xml_diff>